<commit_message>
[updated] docker-compose example in ppt
</commit_message>
<xml_diff>
--- a/Containerize your problems using Docker.pptx
+++ b/Containerize your problems using Docker.pptx
@@ -11954,8 +11954,8 @@
         </p:blipFill>
         <p:spPr>
           <a:xfrm>
-            <a:off x="1703600" y="160550"/>
-            <a:ext cx="5530698" cy="4392025"/>
+            <a:off x="1682363" y="161675"/>
+            <a:ext cx="5131576" cy="4392025"/>
           </a:xfrm>
           <a:prstGeom prst="rect">
             <a:avLst/>
@@ -12521,6 +12521,138 @@
                 <a:sym typeface="Roboto"/>
               </a:rPr>
               <a:t>swetankpoddar.me</a:t>
+            </a:r>
+            <a:endParaRPr>
+              <a:latin typeface="Roboto"/>
+              <a:ea typeface="Roboto"/>
+              <a:cs typeface="Roboto"/>
+              <a:sym typeface="Roboto"/>
+            </a:endParaRPr>
+          </a:p>
+        </p:txBody>
+      </p:sp>
+      <p:pic>
+        <p:nvPicPr>
+          <p:cNvPr id="220" name="Google Shape;220;p29"/>
+          <p:cNvPicPr preferRelativeResize="0"/>
+          <p:nvPr/>
+        </p:nvPicPr>
+        <p:blipFill>
+          <a:blip r:embed="rId5">
+            <a:alphaModFix/>
+          </a:blip>
+          <a:stretch>
+            <a:fillRect/>
+          </a:stretch>
+        </p:blipFill>
+        <p:spPr>
+          <a:xfrm>
+            <a:off x="4191565" y="3299175"/>
+            <a:ext cx="620477" cy="620477"/>
+          </a:xfrm>
+          <a:prstGeom prst="rect">
+            <a:avLst/>
+          </a:prstGeom>
+          <a:noFill/>
+          <a:ln>
+            <a:noFill/>
+          </a:ln>
+        </p:spPr>
+      </p:pic>
+      <p:sp>
+        <p:nvSpPr>
+          <p:cNvPr id="221" name="Google Shape;221;p29"/>
+          <p:cNvSpPr txBox="1"/>
+          <p:nvPr/>
+        </p:nvSpPr>
+        <p:spPr>
+          <a:xfrm>
+            <a:off x="2649613" y="4003175"/>
+            <a:ext cx="3704400" cy="831300"/>
+          </a:xfrm>
+          <a:prstGeom prst="rect">
+            <a:avLst/>
+          </a:prstGeom>
+          <a:noFill/>
+          <a:ln>
+            <a:noFill/>
+          </a:ln>
+        </p:spPr>
+        <p:txBody>
+          <a:bodyPr anchorCtr="0" anchor="t" bIns="91425" lIns="91425" spcFirstLastPara="1" rIns="91425" wrap="square" tIns="91425">
+            <a:spAutoFit/>
+          </a:bodyPr>
+          <a:lstStyle/>
+          <a:p>
+            <a:pPr indent="0" lvl="0" marL="0" rtl="0" algn="ctr">
+              <a:spcBef>
+                <a:spcPts val="0"/>
+              </a:spcBef>
+              <a:spcAft>
+                <a:spcPts val="0"/>
+              </a:spcAft>
+              <a:buNone/>
+            </a:pPr>
+            <a:r>
+              <a:rPr lang="en">
+                <a:latin typeface="Roboto"/>
+                <a:ea typeface="Roboto"/>
+                <a:cs typeface="Roboto"/>
+                <a:sym typeface="Roboto"/>
+              </a:rPr>
+              <a:t>Presentation resources</a:t>
+            </a:r>
+            <a:endParaRPr>
+              <a:latin typeface="Roboto"/>
+              <a:ea typeface="Roboto"/>
+              <a:cs typeface="Roboto"/>
+              <a:sym typeface="Roboto"/>
+            </a:endParaRPr>
+          </a:p>
+          <a:p>
+            <a:pPr indent="0" lvl="0" marL="0" rtl="0" algn="ctr">
+              <a:spcBef>
+                <a:spcPts val="0"/>
+              </a:spcBef>
+              <a:spcAft>
+                <a:spcPts val="0"/>
+              </a:spcAft>
+              <a:buNone/>
+            </a:pPr>
+            <a:r>
+              <a:rPr lang="en">
+                <a:latin typeface="Roboto"/>
+                <a:ea typeface="Roboto"/>
+                <a:cs typeface="Roboto"/>
+                <a:sym typeface="Roboto"/>
+              </a:rPr>
+              <a:t>@</a:t>
+            </a:r>
+            <a:endParaRPr>
+              <a:latin typeface="Roboto"/>
+              <a:ea typeface="Roboto"/>
+              <a:cs typeface="Roboto"/>
+              <a:sym typeface="Roboto"/>
+            </a:endParaRPr>
+          </a:p>
+          <a:p>
+            <a:pPr indent="0" lvl="0" marL="0" rtl="0" algn="ctr">
+              <a:spcBef>
+                <a:spcPts val="0"/>
+              </a:spcBef>
+              <a:spcAft>
+                <a:spcPts val="0"/>
+              </a:spcAft>
+              <a:buNone/>
+            </a:pPr>
+            <a:r>
+              <a:rPr lang="en">
+                <a:latin typeface="Roboto"/>
+                <a:ea typeface="Roboto"/>
+                <a:cs typeface="Roboto"/>
+                <a:sym typeface="Roboto"/>
+              </a:rPr>
+              <a:t>SwetankPoddar/docker-presentation</a:t>
             </a:r>
             <a:endParaRPr>
               <a:latin typeface="Roboto"/>

</xml_diff>